<commit_message>
Update ppt and change name of log
</commit_message>
<xml_diff>
--- a/docs/diagrams/UserGuideCheatSheet.pptx
+++ b/docs/diagrams/UserGuideCheatSheet.pptx
@@ -243,7 +243,7 @@
           <a:p>
             <a:fld id="{6DB52F62-F7BF-4EC5-B91A-F14B49060C0D}" type="datetimeFigureOut">
               <a:rPr lang="en-SG" smtClean="0"/>
-              <a:t>5/4/2017</a:t>
+              <a:t>7/4/2017</a:t>
             </a:fld>
             <a:endParaRPr lang="en-SG"/>
           </a:p>
@@ -413,7 +413,7 @@
           <a:p>
             <a:fld id="{6DB52F62-F7BF-4EC5-B91A-F14B49060C0D}" type="datetimeFigureOut">
               <a:rPr lang="en-SG" smtClean="0"/>
-              <a:t>5/4/2017</a:t>
+              <a:t>7/4/2017</a:t>
             </a:fld>
             <a:endParaRPr lang="en-SG"/>
           </a:p>
@@ -593,7 +593,7 @@
           <a:p>
             <a:fld id="{6DB52F62-F7BF-4EC5-B91A-F14B49060C0D}" type="datetimeFigureOut">
               <a:rPr lang="en-SG" smtClean="0"/>
-              <a:t>5/4/2017</a:t>
+              <a:t>7/4/2017</a:t>
             </a:fld>
             <a:endParaRPr lang="en-SG"/>
           </a:p>
@@ -763,7 +763,7 @@
           <a:p>
             <a:fld id="{6DB52F62-F7BF-4EC5-B91A-F14B49060C0D}" type="datetimeFigureOut">
               <a:rPr lang="en-SG" smtClean="0"/>
-              <a:t>5/4/2017</a:t>
+              <a:t>7/4/2017</a:t>
             </a:fld>
             <a:endParaRPr lang="en-SG"/>
           </a:p>
@@ -1009,7 +1009,7 @@
           <a:p>
             <a:fld id="{6DB52F62-F7BF-4EC5-B91A-F14B49060C0D}" type="datetimeFigureOut">
               <a:rPr lang="en-SG" smtClean="0"/>
-              <a:t>5/4/2017</a:t>
+              <a:t>7/4/2017</a:t>
             </a:fld>
             <a:endParaRPr lang="en-SG"/>
           </a:p>
@@ -1241,7 +1241,7 @@
           <a:p>
             <a:fld id="{6DB52F62-F7BF-4EC5-B91A-F14B49060C0D}" type="datetimeFigureOut">
               <a:rPr lang="en-SG" smtClean="0"/>
-              <a:t>5/4/2017</a:t>
+              <a:t>7/4/2017</a:t>
             </a:fld>
             <a:endParaRPr lang="en-SG"/>
           </a:p>
@@ -1608,7 +1608,7 @@
           <a:p>
             <a:fld id="{6DB52F62-F7BF-4EC5-B91A-F14B49060C0D}" type="datetimeFigureOut">
               <a:rPr lang="en-SG" smtClean="0"/>
-              <a:t>5/4/2017</a:t>
+              <a:t>7/4/2017</a:t>
             </a:fld>
             <a:endParaRPr lang="en-SG"/>
           </a:p>
@@ -1726,7 +1726,7 @@
           <a:p>
             <a:fld id="{6DB52F62-F7BF-4EC5-B91A-F14B49060C0D}" type="datetimeFigureOut">
               <a:rPr lang="en-SG" smtClean="0"/>
-              <a:t>5/4/2017</a:t>
+              <a:t>7/4/2017</a:t>
             </a:fld>
             <a:endParaRPr lang="en-SG"/>
           </a:p>
@@ -1821,7 +1821,7 @@
           <a:p>
             <a:fld id="{6DB52F62-F7BF-4EC5-B91A-F14B49060C0D}" type="datetimeFigureOut">
               <a:rPr lang="en-SG" smtClean="0"/>
-              <a:t>5/4/2017</a:t>
+              <a:t>7/4/2017</a:t>
             </a:fld>
             <a:endParaRPr lang="en-SG"/>
           </a:p>
@@ -2098,7 +2098,7 @@
           <a:p>
             <a:fld id="{6DB52F62-F7BF-4EC5-B91A-F14B49060C0D}" type="datetimeFigureOut">
               <a:rPr lang="en-SG" smtClean="0"/>
-              <a:t>5/4/2017</a:t>
+              <a:t>7/4/2017</a:t>
             </a:fld>
             <a:endParaRPr lang="en-SG"/>
           </a:p>
@@ -2351,7 +2351,7 @@
           <a:p>
             <a:fld id="{6DB52F62-F7BF-4EC5-B91A-F14B49060C0D}" type="datetimeFigureOut">
               <a:rPr lang="en-SG" smtClean="0"/>
-              <a:t>5/4/2017</a:t>
+              <a:t>7/4/2017</a:t>
             </a:fld>
             <a:endParaRPr lang="en-SG"/>
           </a:p>
@@ -2564,7 +2564,7 @@
           <a:p>
             <a:fld id="{6DB52F62-F7BF-4EC5-B91A-F14B49060C0D}" type="datetimeFigureOut">
               <a:rPr lang="en-SG" smtClean="0"/>
-              <a:t>5/4/2017</a:t>
+              <a:t>7/4/2017</a:t>
             </a:fld>
             <a:endParaRPr lang="en-SG"/>
           </a:p>
@@ -3016,14 +3016,14 @@
           <p:nvPr>
             <p:extLst>
               <p:ext uri="{D42A27DB-BD31-4B8C-83A1-F6EECF244321}">
-                <p14:modId xmlns:p14="http://schemas.microsoft.com/office/powerpoint/2010/main" val="3612396685"/>
+                <p14:modId xmlns:p14="http://schemas.microsoft.com/office/powerpoint/2010/main" val="3392050006"/>
               </p:ext>
             </p:extLst>
           </p:nvPr>
         </p:nvGraphicFramePr>
         <p:xfrm>
           <a:off x="296090" y="118774"/>
-          <a:ext cx="11573693" cy="21269774"/>
+          <a:ext cx="11573693" cy="21297151"/>
         </p:xfrm>
         <a:graphic>
           <a:graphicData uri="http://schemas.openxmlformats.org/drawingml/2006/table">
@@ -3156,8 +3156,8 @@
                   </a:ext>
                 </a:extLst>
               </a:tr>
-              <a:tr h="3270261">
-                <a:tc>
+              <a:tr h="698628">
+                <a:tc rowSpan="5">
                   <a:txBody>
                     <a:bodyPr/>
                     <a:lstStyle/>
@@ -3169,66 +3169,54 @@
                       <a:endParaRPr lang="en-SG" dirty="0"/>
                     </a:p>
                   </a:txBody>
-                  <a:tcPr/>
-                </a:tc>
-                <a:tc>
-                  <a:txBody>
-                    <a:bodyPr/>
-                    <a:lstStyle/>
-                    <a:p>
-                      <a:r>
-                        <a:rPr lang="en-SG" dirty="0" smtClean="0"/>
-                        <a:t>Add a new task…</a:t>
-                      </a:r>
-                    </a:p>
-                    <a:p>
-                      <a:endParaRPr lang="en-SG" dirty="0" smtClean="0"/>
-                    </a:p>
-                    <a:p>
-                      <a:r>
-                        <a:rPr lang="en-SG" dirty="0" smtClean="0"/>
-                        <a:t>that</a:t>
-                      </a:r>
-                      <a:r>
-                        <a:rPr lang="en-SG" baseline="0" dirty="0" smtClean="0"/>
-                        <a:t> is an event</a:t>
-                      </a:r>
-                    </a:p>
-                    <a:p>
+                  <a:tcPr>
+                    <a:lnR w="12700" cap="flat" cmpd="sng" algn="ctr">
+                      <a:solidFill>
+                        <a:schemeClr val="bg1"/>
+                      </a:solidFill>
+                      <a:prstDash val="solid"/>
+                      <a:round/>
+                      <a:headEnd type="none" w="med" len="med"/>
+                      <a:tailEnd type="none" w="med" len="med"/>
+                    </a:lnR>
+                  </a:tcPr>
+                </a:tc>
+                <a:tc>
+                  <a:txBody>
+                    <a:bodyPr/>
+                    <a:lstStyle/>
+                    <a:p>
+                      <a:r>
+                        <a:rPr lang="en-SG" dirty="0" smtClean="0"/>
+                        <a:t>Add a new </a:t>
+                      </a:r>
+                      <a:r>
+                        <a:rPr lang="en-SG" dirty="0" smtClean="0"/>
+                        <a:t>task</a:t>
+                      </a:r>
                       <a:endParaRPr lang="en-SG" baseline="0" dirty="0" smtClean="0"/>
                     </a:p>
-                    <a:p>
-                      <a:r>
-                        <a:rPr lang="en-SG" baseline="0" dirty="0" smtClean="0"/>
-                        <a:t>that is a deadline</a:t>
-                      </a:r>
-                    </a:p>
-                    <a:p>
-                      <a:endParaRPr lang="en-SG" baseline="0" dirty="0" smtClean="0"/>
-                    </a:p>
-                    <a:p>
-                      <a:r>
-                        <a:rPr lang="en-SG" baseline="0" dirty="0" smtClean="0"/>
-                        <a:t>with greater priority</a:t>
-                      </a:r>
-                    </a:p>
-                    <a:p>
-                      <a:endParaRPr lang="en-SG" baseline="0" dirty="0" smtClean="0"/>
-                    </a:p>
-                    <a:p>
-                      <a:endParaRPr lang="en-SG" baseline="0" dirty="0" smtClean="0"/>
-                    </a:p>
-                    <a:p>
-                      <a:r>
-                        <a:rPr lang="en-SG" baseline="0" dirty="0" smtClean="0"/>
-                        <a:t>with tags</a:t>
-                      </a:r>
-                    </a:p>
-                    <a:p>
-                      <a:endParaRPr lang="en-SG" baseline="0" dirty="0" smtClean="0"/>
-                    </a:p>
-                  </a:txBody>
-                  <a:tcPr/>
+                  </a:txBody>
+                  <a:tcPr>
+                    <a:lnL w="12700" cap="flat" cmpd="sng" algn="ctr">
+                      <a:solidFill>
+                        <a:schemeClr val="bg1"/>
+                      </a:solidFill>
+                      <a:prstDash val="solid"/>
+                      <a:round/>
+                      <a:headEnd type="none" w="med" len="med"/>
+                      <a:tailEnd type="none" w="med" len="med"/>
+                    </a:lnL>
+                    <a:lnB w="12700" cap="flat" cmpd="sng" algn="ctr">
+                      <a:solidFill>
+                        <a:schemeClr val="bg1"/>
+                      </a:solidFill>
+                      <a:prstDash val="solid"/>
+                      <a:round/>
+                      <a:headEnd type="none" w="med" len="med"/>
+                      <a:tailEnd type="none" w="med" len="med"/>
+                    </a:lnB>
+                  </a:tcPr>
                 </a:tc>
                 <a:tc>
                   <a:txBody>
@@ -3255,7 +3243,15 @@
                             <a:srgbClr val="0070C0"/>
                           </a:solidFill>
                         </a:rPr>
-                        <a:t> buy milk</a:t>
+                        <a:t> buy </a:t>
+                      </a:r>
+                      <a:r>
+                        <a:rPr lang="en-SG" baseline="0" dirty="0" smtClean="0">
+                          <a:solidFill>
+                            <a:srgbClr val="0070C0"/>
+                          </a:solidFill>
+                        </a:rPr>
+                        <a:t>milk</a:t>
                       </a:r>
                       <a:endParaRPr lang="en-SG" dirty="0" smtClean="0">
                         <a:solidFill>
@@ -3263,38 +3259,30 @@
                         </a:solidFill>
                       </a:endParaRPr>
                     </a:p>
-                    <a:p>
-                      <a:r>
-                        <a:rPr lang="en-SG" dirty="0" smtClean="0"/>
-                        <a:t>add DESCRIPTION [\from START_TIME] [\to END_TIME]</a:t>
-                      </a:r>
-                    </a:p>
-                    <a:p>
-                      <a:r>
-                        <a:rPr lang="en-SG" dirty="0" smtClean="0">
-                          <a:solidFill>
-                            <a:srgbClr val="0070C0"/>
-                          </a:solidFill>
-                        </a:rPr>
-                        <a:t>add buy milk \from 12 Oct 3pm \to 4pm 12 Oct</a:t>
-                      </a:r>
-                    </a:p>
-                    <a:p>
-                      <a:r>
-                        <a:rPr lang="en-SG" dirty="0" smtClean="0"/>
-                        <a:t>add DESCRIPTION [\by TIME]</a:t>
-                      </a:r>
-                    </a:p>
-                    <a:p>
-                      <a:r>
-                        <a:rPr lang="en-SG" dirty="0" smtClean="0">
-                          <a:solidFill>
-                            <a:srgbClr val="0070C0"/>
-                          </a:solidFill>
-                        </a:rPr>
-                        <a:t>add buy milk \by 3pm</a:t>
-                      </a:r>
-                    </a:p>
+                  </a:txBody>
+                  <a:tcPr/>
+                </a:tc>
+                <a:extLst>
+                  <a:ext uri="{0D108BD9-81ED-4DB2-BD59-A6C34878D82A}">
+                    <a16:rowId xmlns:a16="http://schemas.microsoft.com/office/drawing/2014/main" val="275264191"/>
+                  </a:ext>
+                </a:extLst>
+              </a:tr>
+              <a:tr h="487680">
+                <a:tc vMerge="1">
+                  <a:txBody>
+                    <a:bodyPr/>
+                    <a:lstStyle/>
+                    <a:p>
+                      <a:endParaRPr lang="en-SG"/>
+                    </a:p>
+                  </a:txBody>
+                  <a:tcPr/>
+                </a:tc>
+                <a:tc>
+                  <a:txBody>
+                    <a:bodyPr/>
+                    <a:lstStyle/>
                     <a:p>
                       <a:pPr marL="0" marR="0" lvl="0" indent="0" algn="l" defTabSz="914400" rtl="0" eaLnBrk="1" fontAlgn="auto" latinLnBrk="0" hangingPunct="1">
                         <a:lnSpc>
@@ -3315,7 +3303,72 @@
                       </a:pPr>
                       <a:r>
                         <a:rPr lang="en-SG" dirty="0" smtClean="0"/>
-                        <a:t>add DESCRIPTION [\as PRIORITY]</a:t>
+                        <a:t>that</a:t>
+                      </a:r>
+                      <a:r>
+                        <a:rPr lang="en-SG" baseline="0" dirty="0" smtClean="0"/>
+                        <a:t> is an event</a:t>
+                      </a:r>
+                    </a:p>
+                  </a:txBody>
+                  <a:tcPr>
+                    <a:lnL w="12700" cap="flat" cmpd="sng" algn="ctr">
+                      <a:solidFill>
+                        <a:schemeClr val="bg1"/>
+                      </a:solidFill>
+                      <a:prstDash val="solid"/>
+                      <a:round/>
+                      <a:headEnd type="none" w="med" len="med"/>
+                      <a:tailEnd type="none" w="med" len="med"/>
+                    </a:lnL>
+                    <a:lnR w="12700" cap="flat" cmpd="sng" algn="ctr">
+                      <a:solidFill>
+                        <a:schemeClr val="bg1"/>
+                      </a:solidFill>
+                      <a:prstDash val="solid"/>
+                      <a:round/>
+                      <a:headEnd type="none" w="med" len="med"/>
+                      <a:tailEnd type="none" w="med" len="med"/>
+                    </a:lnR>
+                    <a:lnT w="12700" cap="flat" cmpd="sng" algn="ctr">
+                      <a:solidFill>
+                        <a:schemeClr val="bg1"/>
+                      </a:solidFill>
+                      <a:prstDash val="solid"/>
+                      <a:round/>
+                      <a:headEnd type="none" w="med" len="med"/>
+                      <a:tailEnd type="none" w="med" len="med"/>
+                    </a:lnT>
+                    <a:lnB w="12700" cap="flat" cmpd="sng" algn="ctr">
+                      <a:solidFill>
+                        <a:schemeClr val="bg1"/>
+                      </a:solidFill>
+                      <a:prstDash val="solid"/>
+                      <a:round/>
+                      <a:headEnd type="none" w="med" len="med"/>
+                      <a:tailEnd type="none" w="med" len="med"/>
+                    </a:lnB>
+                    <a:lnTlToBr w="12700" cmpd="sng">
+                      <a:noFill/>
+                      <a:prstDash val="solid"/>
+                    </a:lnTlToBr>
+                    <a:lnBlToTr w="12700" cmpd="sng">
+                      <a:noFill/>
+                      <a:prstDash val="solid"/>
+                    </a:lnBlToTr>
+                    <a:solidFill>
+                      <a:srgbClr val="EAEFF7"/>
+                    </a:solidFill>
+                  </a:tcPr>
+                </a:tc>
+                <a:tc>
+                  <a:txBody>
+                    <a:bodyPr/>
+                    <a:lstStyle/>
+                    <a:p>
+                      <a:r>
+                        <a:rPr lang="en-SG" dirty="0" smtClean="0"/>
+                        <a:t>add DESCRIPTION [\from START_TIME] [\to END_TIME]</a:t>
                       </a:r>
                     </a:p>
                     <a:p>
@@ -3325,7 +3378,83 @@
                             <a:srgbClr val="0070C0"/>
                           </a:solidFill>
                         </a:rPr>
-                        <a:t>add buy milk \as important</a:t>
+                        <a:t>add buy milk \from 12 Oct 3pm \to 4pm 12 Oct</a:t>
+                      </a:r>
+                    </a:p>
+                  </a:txBody>
+                  <a:tcPr>
+                    <a:lnL w="12700" cap="flat" cmpd="sng" algn="ctr">
+                      <a:solidFill>
+                        <a:schemeClr val="bg1"/>
+                      </a:solidFill>
+                      <a:prstDash val="solid"/>
+                      <a:round/>
+                      <a:headEnd type="none" w="med" len="med"/>
+                      <a:tailEnd type="none" w="med" len="med"/>
+                    </a:lnL>
+                    <a:solidFill>
+                      <a:srgbClr val="EAEFF7"/>
+                    </a:solidFill>
+                  </a:tcPr>
+                </a:tc>
+                <a:extLst>
+                  <a:ext uri="{0D108BD9-81ED-4DB2-BD59-A6C34878D82A}">
+                    <a16:rowId xmlns:a16="http://schemas.microsoft.com/office/drawing/2014/main" val="993356507"/>
+                  </a:ext>
+                </a:extLst>
+              </a:tr>
+              <a:tr h="584320">
+                <a:tc vMerge="1">
+                  <a:txBody>
+                    <a:bodyPr/>
+                    <a:lstStyle/>
+                    <a:p>
+                      <a:endParaRPr lang="en-SG"/>
+                    </a:p>
+                  </a:txBody>
+                  <a:tcPr/>
+                </a:tc>
+                <a:tc>
+                  <a:txBody>
+                    <a:bodyPr/>
+                    <a:lstStyle/>
+                    <a:p>
+                      <a:r>
+                        <a:rPr lang="en-SG" baseline="0" dirty="0" smtClean="0"/>
+                        <a:t>that is a deadline</a:t>
+                      </a:r>
+                      <a:endParaRPr lang="en-SG" baseline="0" dirty="0" smtClean="0"/>
+                    </a:p>
+                  </a:txBody>
+                  <a:tcPr>
+                    <a:lnL w="12700" cap="flat" cmpd="sng" algn="ctr">
+                      <a:solidFill>
+                        <a:schemeClr val="bg1"/>
+                      </a:solidFill>
+                      <a:prstDash val="solid"/>
+                      <a:round/>
+                      <a:headEnd type="none" w="med" len="med"/>
+                      <a:tailEnd type="none" w="med" len="med"/>
+                    </a:lnL>
+                    <a:lnT w="12700" cap="flat" cmpd="sng" algn="ctr">
+                      <a:solidFill>
+                        <a:schemeClr val="bg1"/>
+                      </a:solidFill>
+                      <a:prstDash val="solid"/>
+                      <a:round/>
+                      <a:headEnd type="none" w="med" len="med"/>
+                      <a:tailEnd type="none" w="med" len="med"/>
+                    </a:lnT>
+                  </a:tcPr>
+                </a:tc>
+                <a:tc>
+                  <a:txBody>
+                    <a:bodyPr/>
+                    <a:lstStyle/>
+                    <a:p>
+                      <a:r>
+                        <a:rPr lang="en-SG" dirty="0" smtClean="0"/>
+                        <a:t>add DESCRIPTION [\by TIME]</a:t>
                       </a:r>
                     </a:p>
                     <a:p>
@@ -3335,9 +3464,33 @@
                             <a:srgbClr val="0070C0"/>
                           </a:solidFill>
                         </a:rPr>
-                        <a:t>add buy milk \as very important</a:t>
-                      </a:r>
-                    </a:p>
+                        <a:t>add buy milk \by 3pm</a:t>
+                      </a:r>
+                    </a:p>
+                  </a:txBody>
+                  <a:tcPr/>
+                </a:tc>
+                <a:extLst>
+                  <a:ext uri="{0D108BD9-81ED-4DB2-BD59-A6C34878D82A}">
+                    <a16:rowId xmlns:a16="http://schemas.microsoft.com/office/drawing/2014/main" val="3515171599"/>
+                  </a:ext>
+                </a:extLst>
+              </a:tr>
+              <a:tr h="887428">
+                <a:tc vMerge="1">
+                  <a:txBody>
+                    <a:bodyPr/>
+                    <a:lstStyle/>
+                    <a:p>
+                      <a:endParaRPr lang="en-SG"/>
+                    </a:p>
+                  </a:txBody>
+                  <a:tcPr/>
+                </a:tc>
+                <a:tc>
+                  <a:txBody>
+                    <a:bodyPr/>
+                    <a:lstStyle/>
                     <a:p>
                       <a:pPr marL="0" marR="0" lvl="0" indent="0" algn="l" defTabSz="914400" rtl="0" eaLnBrk="1" fontAlgn="auto" latinLnBrk="0" hangingPunct="1">
                         <a:lnSpc>
@@ -3357,6 +3510,172 @@
                         <a:defRPr/>
                       </a:pPr>
                       <a:r>
+                        <a:rPr lang="en-SG" baseline="0" dirty="0" smtClean="0"/>
+                        <a:t>with greater priority</a:t>
+                      </a:r>
+                    </a:p>
+                  </a:txBody>
+                  <a:tcPr>
+                    <a:lnL w="12700" cap="flat" cmpd="sng" algn="ctr">
+                      <a:solidFill>
+                        <a:schemeClr val="bg1"/>
+                      </a:solidFill>
+                      <a:prstDash val="solid"/>
+                      <a:round/>
+                      <a:headEnd type="none" w="med" len="med"/>
+                      <a:tailEnd type="none" w="med" len="med"/>
+                    </a:lnL>
+                    <a:solidFill>
+                      <a:srgbClr val="EAEFF7"/>
+                    </a:solidFill>
+                  </a:tcPr>
+                </a:tc>
+                <a:tc>
+                  <a:txBody>
+                    <a:bodyPr/>
+                    <a:lstStyle/>
+                    <a:p>
+                      <a:pPr marL="0" marR="0" lvl="0" indent="0" algn="l" defTabSz="914400" rtl="0" eaLnBrk="1" fontAlgn="auto" latinLnBrk="0" hangingPunct="1">
+                        <a:lnSpc>
+                          <a:spcPct val="100000"/>
+                        </a:lnSpc>
+                        <a:spcBef>
+                          <a:spcPts val="0"/>
+                        </a:spcBef>
+                        <a:spcAft>
+                          <a:spcPts val="0"/>
+                        </a:spcAft>
+                        <a:buClrTx/>
+                        <a:buSzTx/>
+                        <a:buFontTx/>
+                        <a:buNone/>
+                        <a:tabLst/>
+                        <a:defRPr/>
+                      </a:pPr>
+                      <a:r>
+                        <a:rPr lang="en-SG" dirty="0" smtClean="0"/>
+                        <a:t>add DESCRIPTION [\as PRIORITY]</a:t>
+                      </a:r>
+                    </a:p>
+                    <a:p>
+                      <a:r>
+                        <a:rPr lang="en-SG" dirty="0" smtClean="0">
+                          <a:solidFill>
+                            <a:srgbClr val="0070C0"/>
+                          </a:solidFill>
+                        </a:rPr>
+                        <a:t>add buy milk \as important</a:t>
+                      </a:r>
+                    </a:p>
+                    <a:p>
+                      <a:r>
+                        <a:rPr lang="en-SG" dirty="0" smtClean="0">
+                          <a:solidFill>
+                            <a:srgbClr val="0070C0"/>
+                          </a:solidFill>
+                        </a:rPr>
+                        <a:t>add buy milk \as very important</a:t>
+                      </a:r>
+                    </a:p>
+                  </a:txBody>
+                  <a:tcPr>
+                    <a:solidFill>
+                      <a:srgbClr val="EAEFF7"/>
+                    </a:solidFill>
+                  </a:tcPr>
+                </a:tc>
+                <a:extLst>
+                  <a:ext uri="{0D108BD9-81ED-4DB2-BD59-A6C34878D82A}">
+                    <a16:rowId xmlns:a16="http://schemas.microsoft.com/office/drawing/2014/main" val="2445623092"/>
+                  </a:ext>
+                </a:extLst>
+              </a:tr>
+              <a:tr h="588675">
+                <a:tc vMerge="1">
+                  <a:txBody>
+                    <a:bodyPr/>
+                    <a:lstStyle/>
+                    <a:p>
+                      <a:endParaRPr lang="en-SG"/>
+                    </a:p>
+                  </a:txBody>
+                  <a:tcPr/>
+                </a:tc>
+                <a:tc>
+                  <a:txBody>
+                    <a:bodyPr/>
+                    <a:lstStyle/>
+                    <a:p>
+                      <a:pPr marL="0" marR="0" lvl="0" indent="0" algn="l" defTabSz="914400" rtl="0" eaLnBrk="1" fontAlgn="auto" latinLnBrk="0" hangingPunct="1">
+                        <a:lnSpc>
+                          <a:spcPct val="100000"/>
+                        </a:lnSpc>
+                        <a:spcBef>
+                          <a:spcPts val="0"/>
+                        </a:spcBef>
+                        <a:spcAft>
+                          <a:spcPts val="0"/>
+                        </a:spcAft>
+                        <a:buClrTx/>
+                        <a:buSzTx/>
+                        <a:buFontTx/>
+                        <a:buNone/>
+                        <a:tabLst/>
+                        <a:defRPr/>
+                      </a:pPr>
+                      <a:r>
+                        <a:rPr lang="en-SG" baseline="0" dirty="0" smtClean="0"/>
+                        <a:t>with tags</a:t>
+                      </a:r>
+                    </a:p>
+                    <a:p>
+                      <a:endParaRPr lang="en-SG" baseline="0" dirty="0" smtClean="0"/>
+                    </a:p>
+                  </a:txBody>
+                  <a:tcPr>
+                    <a:lnL w="12700" cap="flat" cmpd="sng" algn="ctr">
+                      <a:solidFill>
+                        <a:schemeClr val="bg1"/>
+                      </a:solidFill>
+                      <a:prstDash val="solid"/>
+                      <a:round/>
+                      <a:headEnd type="none" w="med" len="med"/>
+                      <a:tailEnd type="none" w="med" len="med"/>
+                    </a:lnL>
+                    <a:lnB w="12700" cap="flat" cmpd="sng" algn="ctr">
+                      <a:solidFill>
+                        <a:schemeClr val="bg1"/>
+                      </a:solidFill>
+                      <a:prstDash val="solid"/>
+                      <a:round/>
+                      <a:headEnd type="none" w="med" len="med"/>
+                      <a:tailEnd type="none" w="med" len="med"/>
+                    </a:lnB>
+                  </a:tcPr>
+                </a:tc>
+                <a:tc>
+                  <a:txBody>
+                    <a:bodyPr/>
+                    <a:lstStyle/>
+                    <a:p>
+                      <a:pPr marL="0" marR="0" lvl="0" indent="0" algn="l" defTabSz="914400" rtl="0" eaLnBrk="1" fontAlgn="auto" latinLnBrk="0" hangingPunct="1">
+                        <a:lnSpc>
+                          <a:spcPct val="100000"/>
+                        </a:lnSpc>
+                        <a:spcBef>
+                          <a:spcPts val="0"/>
+                        </a:spcBef>
+                        <a:spcAft>
+                          <a:spcPts val="0"/>
+                        </a:spcAft>
+                        <a:buClrTx/>
+                        <a:buSzTx/>
+                        <a:buFontTx/>
+                        <a:buNone/>
+                        <a:tabLst/>
+                        <a:defRPr/>
+                      </a:pPr>
+                      <a:r>
                         <a:rPr lang="en-SG" dirty="0" smtClean="0"/>
                         <a:t>add DESCRIPTION [\under TAG]</a:t>
                       </a:r>
@@ -3370,23 +3689,18 @@
                         </a:rPr>
                         <a:t>add buy milk \under shopping friends</a:t>
                       </a:r>
-                      <a:endParaRPr lang="en-SG" dirty="0">
-                        <a:solidFill>
-                          <a:srgbClr val="0070C0"/>
-                        </a:solidFill>
-                      </a:endParaRPr>
                     </a:p>
                   </a:txBody>
                   <a:tcPr/>
                 </a:tc>
                 <a:extLst>
                   <a:ext uri="{0D108BD9-81ED-4DB2-BD59-A6C34878D82A}">
-                    <a16:rowId xmlns:a16="http://schemas.microsoft.com/office/drawing/2014/main" val="275264191"/>
+                    <a16:rowId xmlns:a16="http://schemas.microsoft.com/office/drawing/2014/main" val="3482169764"/>
                   </a:ext>
                 </a:extLst>
               </a:tr>
-              <a:tr h="3564716">
-                <a:tc>
+              <a:tr h="1247738">
+                <a:tc rowSpan="3">
                   <a:txBody>
                     <a:bodyPr/>
                     <a:lstStyle/>
@@ -3398,7 +3712,17 @@
                       <a:endParaRPr lang="en-SG" dirty="0"/>
                     </a:p>
                   </a:txBody>
-                  <a:tcPr/>
+                  <a:tcPr>
+                    <a:lnR w="12700" cap="flat" cmpd="sng" algn="ctr">
+                      <a:solidFill>
+                        <a:schemeClr val="bg1"/>
+                      </a:solidFill>
+                      <a:prstDash val="solid"/>
+                      <a:round/>
+                      <a:headEnd type="none" w="med" len="med"/>
+                      <a:tailEnd type="none" w="med" len="med"/>
+                    </a:lnR>
+                  </a:tcPr>
                 </a:tc>
                 <a:tc>
                   <a:txBody>
@@ -3429,42 +3753,67 @@
                     <a:p>
                       <a:r>
                         <a:rPr lang="en-SG" baseline="0" dirty="0" smtClean="0"/>
-                        <a:t>that are finished</a:t>
-                      </a:r>
-                    </a:p>
-                    <a:p>
+                        <a:t>that are </a:t>
+                      </a:r>
+                      <a:r>
+                        <a:rPr lang="en-SG" baseline="0" dirty="0" smtClean="0"/>
+                        <a:t>finished</a:t>
+                      </a:r>
                       <a:endParaRPr lang="en-SG" baseline="0" dirty="0" smtClean="0"/>
                     </a:p>
-                    <a:p>
-                      <a:r>
-                        <a:rPr lang="en-SG" baseline="0" dirty="0" smtClean="0"/>
-                        <a:t>L</a:t>
-                      </a:r>
-                      <a:r>
-                        <a:rPr lang="en-SG" dirty="0" smtClean="0"/>
-                        <a:t>ist tasks occurring during a time period</a:t>
-                      </a:r>
-                    </a:p>
-                    <a:p>
-                      <a:endParaRPr lang="en-SG" baseline="0" dirty="0" smtClean="0"/>
-                    </a:p>
-                    <a:p>
-                      <a:endParaRPr lang="en-SG" baseline="0" dirty="0" smtClean="0"/>
-                    </a:p>
-                    <a:p>
-                      <a:endParaRPr lang="en-SG" baseline="0" dirty="0" smtClean="0"/>
-                    </a:p>
-                    <a:p>
-                      <a:endParaRPr lang="en-SG" baseline="0" dirty="0" smtClean="0"/>
-                    </a:p>
-                    <a:p>
-                      <a:r>
-                        <a:rPr lang="en-SG" baseline="0" dirty="0" smtClean="0"/>
-                        <a:t>List tasks under a certain tag</a:t>
-                      </a:r>
-                    </a:p>
-                  </a:txBody>
-                  <a:tcPr/>
+                  </a:txBody>
+                  <a:tcPr>
+                    <a:lnL w="12700" cap="flat" cmpd="sng" algn="ctr">
+                      <a:solidFill>
+                        <a:schemeClr val="bg1"/>
+                      </a:solidFill>
+                      <a:prstDash val="solid"/>
+                      <a:round/>
+                      <a:headEnd type="none" w="med" len="med"/>
+                      <a:tailEnd type="none" w="med" len="med"/>
+                    </a:lnL>
+                    <a:lnR w="12700" cap="flat" cmpd="sng" algn="ctr">
+                      <a:solidFill>
+                        <a:schemeClr val="bg1"/>
+                      </a:solidFill>
+                      <a:prstDash val="solid"/>
+                      <a:round/>
+                      <a:headEnd type="none" w="med" len="med"/>
+                      <a:tailEnd type="none" w="med" len="med"/>
+                    </a:lnR>
+                    <a:lnT w="12700" cap="flat" cmpd="sng" algn="ctr">
+                      <a:solidFill>
+                        <a:schemeClr val="bg1"/>
+                      </a:solidFill>
+                      <a:prstDash val="solid"/>
+                      <a:round/>
+                      <a:headEnd type="none" w="med" len="med"/>
+                      <a:tailEnd type="none" w="med" len="med"/>
+                    </a:lnT>
+                    <a:lnB w="12700" cap="flat" cmpd="sng" algn="ctr">
+                      <a:solidFill>
+                        <a:schemeClr val="bg1"/>
+                      </a:solidFill>
+                      <a:prstDash val="solid"/>
+                      <a:round/>
+                      <a:headEnd type="none" w="med" len="med"/>
+                      <a:tailEnd type="none" w="med" len="med"/>
+                    </a:lnB>
+                    <a:lnTlToBr w="12700" cap="flat" cmpd="sng" algn="ctr">
+                      <a:noFill/>
+                      <a:prstDash val="solid"/>
+                      <a:round/>
+                      <a:headEnd type="none" w="med" len="med"/>
+                      <a:tailEnd type="none" w="med" len="med"/>
+                    </a:lnTlToBr>
+                    <a:lnBlToTr w="12700" cmpd="sng">
+                      <a:noFill/>
+                      <a:prstDash val="solid"/>
+                    </a:lnBlToTr>
+                    <a:solidFill>
+                      <a:srgbClr val="D2DEEF"/>
+                    </a:solidFill>
+                  </a:tcPr>
                 </a:tc>
                 <a:tc>
                   <a:txBody>
@@ -3507,16 +3856,103 @@
                             <a:srgbClr val="0070C0"/>
                           </a:solidFill>
                         </a:rPr>
-                        <a:t>list finished</a:t>
-                      </a:r>
-                    </a:p>
-                    <a:p>
+                        <a:t>list </a:t>
+                      </a:r>
+                      <a:r>
+                        <a:rPr lang="en-SG" baseline="0" dirty="0" smtClean="0">
+                          <a:solidFill>
+                            <a:srgbClr val="0070C0"/>
+                          </a:solidFill>
+                        </a:rPr>
+                        <a:t>finished</a:t>
+                      </a:r>
                       <a:endParaRPr lang="en-SG" baseline="0" dirty="0" smtClean="0">
                         <a:solidFill>
                           <a:srgbClr val="0070C0"/>
                         </a:solidFill>
                       </a:endParaRPr>
                     </a:p>
+                  </a:txBody>
+                  <a:tcPr>
+                    <a:lnL w="12700" cap="flat" cmpd="sng" algn="ctr">
+                      <a:solidFill>
+                        <a:schemeClr val="bg1"/>
+                      </a:solidFill>
+                      <a:prstDash val="solid"/>
+                      <a:round/>
+                      <a:headEnd type="none" w="med" len="med"/>
+                      <a:tailEnd type="none" w="med" len="med"/>
+                    </a:lnL>
+                  </a:tcPr>
+                </a:tc>
+                <a:extLst>
+                  <a:ext uri="{0D108BD9-81ED-4DB2-BD59-A6C34878D82A}">
+                    <a16:rowId xmlns:a16="http://schemas.microsoft.com/office/drawing/2014/main" val="1725809477"/>
+                  </a:ext>
+                </a:extLst>
+              </a:tr>
+              <a:tr h="1256446">
+                <a:tc vMerge="1">
+                  <a:txBody>
+                    <a:bodyPr/>
+                    <a:lstStyle/>
+                    <a:p>
+                      <a:endParaRPr lang="en-SG"/>
+                    </a:p>
+                  </a:txBody>
+                  <a:tcPr/>
+                </a:tc>
+                <a:tc>
+                  <a:txBody>
+                    <a:bodyPr/>
+                    <a:lstStyle/>
+                    <a:p>
+                      <a:pPr marL="0" marR="0" lvl="0" indent="0" algn="l" defTabSz="914400" rtl="0" eaLnBrk="1" fontAlgn="auto" latinLnBrk="0" hangingPunct="1">
+                        <a:lnSpc>
+                          <a:spcPct val="100000"/>
+                        </a:lnSpc>
+                        <a:spcBef>
+                          <a:spcPts val="0"/>
+                        </a:spcBef>
+                        <a:spcAft>
+                          <a:spcPts val="0"/>
+                        </a:spcAft>
+                        <a:buClrTx/>
+                        <a:buSzTx/>
+                        <a:buFontTx/>
+                        <a:buNone/>
+                        <a:tabLst/>
+                        <a:defRPr/>
+                      </a:pPr>
+                      <a:r>
+                        <a:rPr lang="en-SG" baseline="0" dirty="0" smtClean="0"/>
+                        <a:t>L</a:t>
+                      </a:r>
+                      <a:r>
+                        <a:rPr lang="en-SG" dirty="0" smtClean="0"/>
+                        <a:t>ist tasks occurring during a time period</a:t>
+                      </a:r>
+                    </a:p>
+                  </a:txBody>
+                  <a:tcPr>
+                    <a:lnT w="12700" cap="flat" cmpd="sng" algn="ctr">
+                      <a:solidFill>
+                        <a:schemeClr val="bg1"/>
+                      </a:solidFill>
+                      <a:prstDash val="solid"/>
+                      <a:round/>
+                      <a:headEnd type="none" w="med" len="med"/>
+                      <a:tailEnd type="none" w="med" len="med"/>
+                    </a:lnT>
+                    <a:solidFill>
+                      <a:srgbClr val="D2DEEF"/>
+                    </a:solidFill>
+                  </a:tcPr>
+                </a:tc>
+                <a:tc>
+                  <a:txBody>
+                    <a:bodyPr/>
+                    <a:lstStyle/>
                     <a:p>
                       <a:r>
                         <a:rPr lang="en-SG" dirty="0" smtClean="0"/>
@@ -3581,13 +4017,64 @@
                         <a:t> \in this week</a:t>
                       </a:r>
                     </a:p>
-                    <a:p>
-                      <a:endParaRPr lang="en-SG" baseline="0" dirty="0" smtClean="0">
-                        <a:solidFill>
-                          <a:srgbClr val="0070C0"/>
-                        </a:solidFill>
-                      </a:endParaRPr>
-                    </a:p>
+                  </a:txBody>
+                  <a:tcPr>
+                    <a:solidFill>
+                      <a:srgbClr val="D2DEEF"/>
+                    </a:solidFill>
+                  </a:tcPr>
+                </a:tc>
+                <a:extLst>
+                  <a:ext uri="{0D108BD9-81ED-4DB2-BD59-A6C34878D82A}">
+                    <a16:rowId xmlns:a16="http://schemas.microsoft.com/office/drawing/2014/main" val="2831462227"/>
+                  </a:ext>
+                </a:extLst>
+              </a:tr>
+              <a:tr h="824902">
+                <a:tc vMerge="1">
+                  <a:txBody>
+                    <a:bodyPr/>
+                    <a:lstStyle/>
+                    <a:p>
+                      <a:endParaRPr lang="en-SG"/>
+                    </a:p>
+                  </a:txBody>
+                  <a:tcPr/>
+                </a:tc>
+                <a:tc>
+                  <a:txBody>
+                    <a:bodyPr/>
+                    <a:lstStyle/>
+                    <a:p>
+                      <a:pPr marL="0" marR="0" lvl="0" indent="0" algn="l" defTabSz="914400" rtl="0" eaLnBrk="1" fontAlgn="auto" latinLnBrk="0" hangingPunct="1">
+                        <a:lnSpc>
+                          <a:spcPct val="100000"/>
+                        </a:lnSpc>
+                        <a:spcBef>
+                          <a:spcPts val="0"/>
+                        </a:spcBef>
+                        <a:spcAft>
+                          <a:spcPts val="0"/>
+                        </a:spcAft>
+                        <a:buClrTx/>
+                        <a:buSzTx/>
+                        <a:buFontTx/>
+                        <a:buNone/>
+                        <a:tabLst/>
+                        <a:defRPr/>
+                      </a:pPr>
+                      <a:r>
+                        <a:rPr lang="en-SG" baseline="0" dirty="0" smtClean="0"/>
+                        <a:t>List tasks under a certain tag</a:t>
+                      </a:r>
+                    </a:p>
+                  </a:txBody>
+                  <a:tcPr/>
+                </a:tc>
+                <a:tc>
+                  <a:txBody>
+                    <a:bodyPr/>
+                    <a:lstStyle/>
                     <a:p>
                       <a:r>
                         <a:rPr lang="en-SG" baseline="0" dirty="0" smtClean="0">
@@ -3617,7 +4104,7 @@
                 </a:tc>
                 <a:extLst>
                   <a:ext uri="{0D108BD9-81ED-4DB2-BD59-A6C34878D82A}">
-                    <a16:rowId xmlns:a16="http://schemas.microsoft.com/office/drawing/2014/main" val="1725809477"/>
+                    <a16:rowId xmlns:a16="http://schemas.microsoft.com/office/drawing/2014/main" val="311317339"/>
                   </a:ext>
                 </a:extLst>
               </a:tr>
@@ -3645,7 +4132,6 @@
                         <a:rPr lang="en-SG" baseline="0" dirty="0" smtClean="0"/>
                         <a:t>Sort tasks by priority, time or alphabetical order (can be combined in any order)</a:t>
                       </a:r>
-                      <a:endParaRPr lang="en-SG" baseline="0" dirty="0" smtClean="0"/>
                     </a:p>
                   </a:txBody>
                   <a:tcPr/>

</xml_diff>

<commit_message>
Edits to user guide
</commit_message>
<xml_diff>
--- a/docs/diagrams/UserGuideCheatSheet.pptx
+++ b/docs/diagrams/UserGuideCheatSheet.pptx
@@ -3016,7 +3016,7 @@
           <p:nvPr>
             <p:extLst>
               <p:ext uri="{D42A27DB-BD31-4B8C-83A1-F6EECF244321}">
-                <p14:modId xmlns:p14="http://schemas.microsoft.com/office/powerpoint/2010/main" val="3392050006"/>
+                <p14:modId xmlns:p14="http://schemas.microsoft.com/office/powerpoint/2010/main" val="2161453325"/>
               </p:ext>
             </p:extLst>
           </p:nvPr>
@@ -3188,11 +3188,7 @@
                     <a:p>
                       <a:r>
                         <a:rPr lang="en-SG" dirty="0" smtClean="0"/>
-                        <a:t>Add a new </a:t>
-                      </a:r>
-                      <a:r>
-                        <a:rPr lang="en-SG" dirty="0" smtClean="0"/>
-                        <a:t>task</a:t>
+                        <a:t>Add a new task</a:t>
                       </a:r>
                       <a:endParaRPr lang="en-SG" baseline="0" dirty="0" smtClean="0"/>
                     </a:p>
@@ -3243,15 +3239,7 @@
                             <a:srgbClr val="0070C0"/>
                           </a:solidFill>
                         </a:rPr>
-                        <a:t> buy </a:t>
-                      </a:r>
-                      <a:r>
-                        <a:rPr lang="en-SG" baseline="0" dirty="0" smtClean="0">
-                          <a:solidFill>
-                            <a:srgbClr val="0070C0"/>
-                          </a:solidFill>
-                        </a:rPr>
-                        <a:t>milk</a:t>
+                        <a:t> buy milk</a:t>
                       </a:r>
                       <a:endParaRPr lang="en-SG" dirty="0" smtClean="0">
                         <a:solidFill>
@@ -3423,7 +3411,6 @@
                         <a:rPr lang="en-SG" baseline="0" dirty="0" smtClean="0"/>
                         <a:t>that is a deadline</a:t>
                       </a:r>
-                      <a:endParaRPr lang="en-SG" baseline="0" dirty="0" smtClean="0"/>
                     </a:p>
                   </a:txBody>
                   <a:tcPr>
@@ -3753,13 +3740,8 @@
                     <a:p>
                       <a:r>
                         <a:rPr lang="en-SG" baseline="0" dirty="0" smtClean="0"/>
-                        <a:t>that are </a:t>
-                      </a:r>
-                      <a:r>
-                        <a:rPr lang="en-SG" baseline="0" dirty="0" smtClean="0"/>
-                        <a:t>finished</a:t>
-                      </a:r>
-                      <a:endParaRPr lang="en-SG" baseline="0" dirty="0" smtClean="0"/>
+                        <a:t>that are finished</a:t>
+                      </a:r>
                     </a:p>
                   </a:txBody>
                   <a:tcPr>
@@ -3856,21 +3838,8 @@
                             <a:srgbClr val="0070C0"/>
                           </a:solidFill>
                         </a:rPr>
-                        <a:t>list </a:t>
-                      </a:r>
-                      <a:r>
-                        <a:rPr lang="en-SG" baseline="0" dirty="0" smtClean="0">
-                          <a:solidFill>
-                            <a:srgbClr val="0070C0"/>
-                          </a:solidFill>
-                        </a:rPr>
-                        <a:t>finished</a:t>
-                      </a:r>
-                      <a:endParaRPr lang="en-SG" baseline="0" dirty="0" smtClean="0">
-                        <a:solidFill>
-                          <a:srgbClr val="0070C0"/>
-                        </a:solidFill>
-                      </a:endParaRPr>
+                        <a:t>list finished</a:t>
+                      </a:r>
                     </a:p>
                   </a:txBody>
                   <a:tcPr>
@@ -4271,9 +4240,10 @@
                     <a:lstStyle/>
                     <a:p>
                       <a:r>
-                        <a:rPr lang="en-SG" dirty="0" smtClean="0"/>
-                        <a:t>find 'QUERY' ['QUERY'...]</a:t>
-                      </a:r>
+                        <a:rPr lang="en-SG" smtClean="0"/>
+                        <a:t>find QUERY [QUERY...]</a:t>
+                      </a:r>
+                      <a:endParaRPr lang="en-SG" dirty="0" smtClean="0"/>
                     </a:p>
                     <a:p>
                       <a:r>
@@ -4642,8 +4612,21 @@
                     <a:p>
                       <a:r>
                         <a:rPr lang="en-SG" dirty="0" smtClean="0"/>
-                        <a:t>delete INDEX [INDEX...] [STARTING_INDEX-ENDING_INDEX]</a:t>
-                      </a:r>
+                        <a:t>delete INDEX [INDEX...] </a:t>
+                      </a:r>
+                      <a:r>
+                        <a:rPr lang="en-SG" dirty="0" smtClean="0"/>
+                        <a:t>[INDEX1</a:t>
+                      </a:r>
+                      <a:r>
+                        <a:rPr lang="en-SG" baseline="0" dirty="0" smtClean="0"/>
+                        <a:t> – </a:t>
+                      </a:r>
+                      <a:r>
+                        <a:rPr lang="en-SG" dirty="0" smtClean="0"/>
+                        <a:t>INDEX2]</a:t>
+                      </a:r>
+                      <a:endParaRPr lang="en-SG" dirty="0" smtClean="0"/>
                     </a:p>
                     <a:p>
                       <a:pPr marL="0" marR="0" lvl="0" indent="0" algn="l" defTabSz="914400" rtl="0" eaLnBrk="1" fontAlgn="auto" latinLnBrk="0" hangingPunct="1">
@@ -4742,8 +4725,25 @@
                       </a:pPr>
                       <a:r>
                         <a:rPr lang="en-SG" dirty="0" smtClean="0"/>
-                        <a:t>finish INDEX [INDEX...] [STARTING_INDEX-ENDING_INDEX]</a:t>
-                      </a:r>
+                        <a:t>finish INDEX [INDEX...] </a:t>
+                      </a:r>
+                      <a:r>
+                        <a:rPr lang="en-SG" dirty="0" smtClean="0"/>
+                        <a:t>[</a:t>
+                      </a:r>
+                      <a:r>
+                        <a:rPr lang="en-SG" smtClean="0"/>
+                        <a:t>INDEX1</a:t>
+                      </a:r>
+                      <a:r>
+                        <a:rPr lang="en-SG" baseline="0" smtClean="0"/>
+                        <a:t> – INDEX2</a:t>
+                      </a:r>
+                      <a:r>
+                        <a:rPr lang="en-SG" smtClean="0"/>
+                        <a:t>]</a:t>
+                      </a:r>
+                      <a:endParaRPr lang="en-SG" dirty="0" smtClean="0"/>
                     </a:p>
                     <a:p>
                       <a:pPr marL="0" marR="0" lvl="0" indent="0" algn="l" defTabSz="914400" rtl="0" eaLnBrk="1" fontAlgn="auto" latinLnBrk="0" hangingPunct="1">

</xml_diff>